<commit_message>
Secondary coupling analytical solution
I validate the equation by place the all variables from spice model. Now, I try to a algorithm to find a required mutual inductance
</commit_message>
<xml_diff>
--- a/Reports/WPT/Coupling_Analytical_Design.pptx
+++ b/Reports/WPT/Coupling_Analytical_Design.pptx
@@ -302,7 +302,7 @@
           <a:p>
             <a:fld id="{5605B21B-2DA9-4319-98CA-C59245C20BBE}" type="datetimeFigureOut">
               <a:rPr lang="en-US" smtClean="0"/>
-              <a:t>4/9/2020</a:t>
+              <a:t>4/13/2020</a:t>
             </a:fld>
             <a:endParaRPr lang="en-US"/>
           </a:p>
@@ -500,7 +500,7 @@
           <a:p>
             <a:fld id="{5605B21B-2DA9-4319-98CA-C59245C20BBE}" type="datetimeFigureOut">
               <a:rPr lang="en-US" smtClean="0"/>
-              <a:t>4/9/2020</a:t>
+              <a:t>4/13/2020</a:t>
             </a:fld>
             <a:endParaRPr lang="en-US"/>
           </a:p>
@@ -708,7 +708,7 @@
           <a:p>
             <a:fld id="{5605B21B-2DA9-4319-98CA-C59245C20BBE}" type="datetimeFigureOut">
               <a:rPr lang="en-US" smtClean="0"/>
-              <a:t>4/9/2020</a:t>
+              <a:t>4/13/2020</a:t>
             </a:fld>
             <a:endParaRPr lang="en-US"/>
           </a:p>
@@ -906,7 +906,7 @@
           <a:p>
             <a:fld id="{5605B21B-2DA9-4319-98CA-C59245C20BBE}" type="datetimeFigureOut">
               <a:rPr lang="en-US" smtClean="0"/>
-              <a:t>4/9/2020</a:t>
+              <a:t>4/13/2020</a:t>
             </a:fld>
             <a:endParaRPr lang="en-US"/>
           </a:p>
@@ -1181,7 +1181,7 @@
           <a:p>
             <a:fld id="{5605B21B-2DA9-4319-98CA-C59245C20BBE}" type="datetimeFigureOut">
               <a:rPr lang="en-US" smtClean="0"/>
-              <a:t>4/9/2020</a:t>
+              <a:t>4/13/2020</a:t>
             </a:fld>
             <a:endParaRPr lang="en-US"/>
           </a:p>
@@ -1446,7 +1446,7 @@
           <a:p>
             <a:fld id="{5605B21B-2DA9-4319-98CA-C59245C20BBE}" type="datetimeFigureOut">
               <a:rPr lang="en-US" smtClean="0"/>
-              <a:t>4/9/2020</a:t>
+              <a:t>4/13/2020</a:t>
             </a:fld>
             <a:endParaRPr lang="en-US"/>
           </a:p>
@@ -1858,7 +1858,7 @@
           <a:p>
             <a:fld id="{5605B21B-2DA9-4319-98CA-C59245C20BBE}" type="datetimeFigureOut">
               <a:rPr lang="en-US" smtClean="0"/>
-              <a:t>4/9/2020</a:t>
+              <a:t>4/13/2020</a:t>
             </a:fld>
             <a:endParaRPr lang="en-US"/>
           </a:p>
@@ -1999,7 +1999,7 @@
           <a:p>
             <a:fld id="{5605B21B-2DA9-4319-98CA-C59245C20BBE}" type="datetimeFigureOut">
               <a:rPr lang="en-US" smtClean="0"/>
-              <a:t>4/9/2020</a:t>
+              <a:t>4/13/2020</a:t>
             </a:fld>
             <a:endParaRPr lang="en-US"/>
           </a:p>
@@ -2112,7 +2112,7 @@
           <a:p>
             <a:fld id="{5605B21B-2DA9-4319-98CA-C59245C20BBE}" type="datetimeFigureOut">
               <a:rPr lang="en-US" smtClean="0"/>
-              <a:t>4/9/2020</a:t>
+              <a:t>4/13/2020</a:t>
             </a:fld>
             <a:endParaRPr lang="en-US"/>
           </a:p>
@@ -2423,7 +2423,7 @@
           <a:p>
             <a:fld id="{5605B21B-2DA9-4319-98CA-C59245C20BBE}" type="datetimeFigureOut">
               <a:rPr lang="en-US" smtClean="0"/>
-              <a:t>4/9/2020</a:t>
+              <a:t>4/13/2020</a:t>
             </a:fld>
             <a:endParaRPr lang="en-US"/>
           </a:p>
@@ -2711,7 +2711,7 @@
           <a:p>
             <a:fld id="{5605B21B-2DA9-4319-98CA-C59245C20BBE}" type="datetimeFigureOut">
               <a:rPr lang="en-US" smtClean="0"/>
-              <a:t>4/9/2020</a:t>
+              <a:t>4/13/2020</a:t>
             </a:fld>
             <a:endParaRPr lang="en-US"/>
           </a:p>
@@ -2952,7 +2952,7 @@
           <a:p>
             <a:fld id="{5605B21B-2DA9-4319-98CA-C59245C20BBE}" type="datetimeFigureOut">
               <a:rPr lang="en-US" smtClean="0"/>
-              <a:t>4/9/2020</a:t>
+              <a:t>4/13/2020</a:t>
             </a:fld>
             <a:endParaRPr lang="en-US"/>
           </a:p>

</xml_diff>

<commit_message>
Experimental inductance values are implemented in simulation env
The results, problems we can face are reported
</commit_message>
<xml_diff>
--- a/Reports/WPT/Coupling_Analytical_Design.pptx
+++ b/Reports/WPT/Coupling_Analytical_Design.pptx
@@ -302,7 +302,7 @@
           <a:p>
             <a:fld id="{5605B21B-2DA9-4319-98CA-C59245C20BBE}" type="datetimeFigureOut">
               <a:rPr lang="en-US" smtClean="0"/>
-              <a:t>4/24/2020</a:t>
+              <a:t>5/21/2020</a:t>
             </a:fld>
             <a:endParaRPr lang="en-US"/>
           </a:p>
@@ -500,7 +500,7 @@
           <a:p>
             <a:fld id="{5605B21B-2DA9-4319-98CA-C59245C20BBE}" type="datetimeFigureOut">
               <a:rPr lang="en-US" smtClean="0"/>
-              <a:t>4/24/2020</a:t>
+              <a:t>5/21/2020</a:t>
             </a:fld>
             <a:endParaRPr lang="en-US"/>
           </a:p>
@@ -708,7 +708,7 @@
           <a:p>
             <a:fld id="{5605B21B-2DA9-4319-98CA-C59245C20BBE}" type="datetimeFigureOut">
               <a:rPr lang="en-US" smtClean="0"/>
-              <a:t>4/24/2020</a:t>
+              <a:t>5/21/2020</a:t>
             </a:fld>
             <a:endParaRPr lang="en-US"/>
           </a:p>
@@ -906,7 +906,7 @@
           <a:p>
             <a:fld id="{5605B21B-2DA9-4319-98CA-C59245C20BBE}" type="datetimeFigureOut">
               <a:rPr lang="en-US" smtClean="0"/>
-              <a:t>4/24/2020</a:t>
+              <a:t>5/21/2020</a:t>
             </a:fld>
             <a:endParaRPr lang="en-US"/>
           </a:p>
@@ -1181,7 +1181,7 @@
           <a:p>
             <a:fld id="{5605B21B-2DA9-4319-98CA-C59245C20BBE}" type="datetimeFigureOut">
               <a:rPr lang="en-US" smtClean="0"/>
-              <a:t>4/24/2020</a:t>
+              <a:t>5/21/2020</a:t>
             </a:fld>
             <a:endParaRPr lang="en-US"/>
           </a:p>
@@ -1446,7 +1446,7 @@
           <a:p>
             <a:fld id="{5605B21B-2DA9-4319-98CA-C59245C20BBE}" type="datetimeFigureOut">
               <a:rPr lang="en-US" smtClean="0"/>
-              <a:t>4/24/2020</a:t>
+              <a:t>5/21/2020</a:t>
             </a:fld>
             <a:endParaRPr lang="en-US"/>
           </a:p>
@@ -1858,7 +1858,7 @@
           <a:p>
             <a:fld id="{5605B21B-2DA9-4319-98CA-C59245C20BBE}" type="datetimeFigureOut">
               <a:rPr lang="en-US" smtClean="0"/>
-              <a:t>4/24/2020</a:t>
+              <a:t>5/21/2020</a:t>
             </a:fld>
             <a:endParaRPr lang="en-US"/>
           </a:p>
@@ -1999,7 +1999,7 @@
           <a:p>
             <a:fld id="{5605B21B-2DA9-4319-98CA-C59245C20BBE}" type="datetimeFigureOut">
               <a:rPr lang="en-US" smtClean="0"/>
-              <a:t>4/24/2020</a:t>
+              <a:t>5/21/2020</a:t>
             </a:fld>
             <a:endParaRPr lang="en-US"/>
           </a:p>
@@ -2112,7 +2112,7 @@
           <a:p>
             <a:fld id="{5605B21B-2DA9-4319-98CA-C59245C20BBE}" type="datetimeFigureOut">
               <a:rPr lang="en-US" smtClean="0"/>
-              <a:t>4/24/2020</a:t>
+              <a:t>5/21/2020</a:t>
             </a:fld>
             <a:endParaRPr lang="en-US"/>
           </a:p>
@@ -2423,7 +2423,7 @@
           <a:p>
             <a:fld id="{5605B21B-2DA9-4319-98CA-C59245C20BBE}" type="datetimeFigureOut">
               <a:rPr lang="en-US" smtClean="0"/>
-              <a:t>4/24/2020</a:t>
+              <a:t>5/21/2020</a:t>
             </a:fld>
             <a:endParaRPr lang="en-US"/>
           </a:p>
@@ -2711,7 +2711,7 @@
           <a:p>
             <a:fld id="{5605B21B-2DA9-4319-98CA-C59245C20BBE}" type="datetimeFigureOut">
               <a:rPr lang="en-US" smtClean="0"/>
-              <a:t>4/24/2020</a:t>
+              <a:t>5/21/2020</a:t>
             </a:fld>
             <a:endParaRPr lang="en-US"/>
           </a:p>
@@ -2952,7 +2952,7 @@
           <a:p>
             <a:fld id="{5605B21B-2DA9-4319-98CA-C59245C20BBE}" type="datetimeFigureOut">
               <a:rPr lang="en-US" smtClean="0"/>
-              <a:t>4/24/2020</a:t>
+              <a:t>5/21/2020</a:t>
             </a:fld>
             <a:endParaRPr lang="en-US"/>
           </a:p>
@@ -21003,7 +21003,7 @@
         </p:nvSpPr>
         <p:spPr>
           <a:xfrm>
-            <a:off x="741522" y="2800778"/>
+            <a:off x="523161" y="2696107"/>
             <a:ext cx="11145678" cy="1754326"/>
           </a:xfrm>
           <a:prstGeom prst="rect">

</xml_diff>